<commit_message>
demo link to shorten cut
</commit_message>
<xml_diff>
--- a/philips/documentation.pptx
+++ b/philips/documentation.pptx
@@ -10066,7 +10066,7 @@
         </p:blipFill>
         <p:spPr>
           <a:xfrm>
-            <a:off x="1758298" y="1084726"/>
+            <a:off x="1758298" y="1014162"/>
             <a:ext cx="5935980" cy="5082540"/>
           </a:xfrm>
           <a:prstGeom prst="rect">
@@ -10082,8 +10082,8 @@
         </p:nvSpPr>
         <p:spPr>
           <a:xfrm>
-            <a:off x="2734160" y="6280255"/>
-            <a:ext cx="3572537" cy="369332"/>
+            <a:off x="3009887" y="6103848"/>
+            <a:ext cx="3572538" cy="646331"/>
           </a:xfrm>
           <a:prstGeom prst="rect">
             <a:avLst/>
@@ -10096,6 +10096,7 @@
           </a:bodyPr>
           <a:lstStyle/>
           <a:p>
+            <a:pPr algn="ctr"/>
             <a:r>
               <a:rPr lang="en-US" b="1" dirty="0" smtClean="0"/>
               <a:t>Please</a:t>
@@ -10140,7 +10141,22 @@
               <a:rPr lang="en-US" altLang="zh-CN" b="1" dirty="0" smtClean="0"/>
               <a:t>file</a:t>
             </a:r>
-            <a:endParaRPr lang="en-US" b="1" dirty="0"/>
+          </a:p>
+          <a:p>
+            <a:pPr algn="ctr"/>
+            <a:r>
+              <a:rPr lang="en-US" dirty="0"/>
+              <a:t>https://</a:t>
+            </a:r>
+            <a:r>
+              <a:rPr lang="en-US" dirty="0" err="1"/>
+              <a:t>goo.gl</a:t>
+            </a:r>
+            <a:r>
+              <a:rPr lang="en-US" dirty="0"/>
+              <a:t>/2Nr4Ns</a:t>
+            </a:r>
+            <a:endParaRPr lang="en-US" dirty="0"/>
           </a:p>
         </p:txBody>
       </p:sp>

</xml_diff>

<commit_message>
correct typo at slide 8 in the documentation PPT
</commit_message>
<xml_diff>
--- a/philips/documentation.pptx
+++ b/philips/documentation.pptx
@@ -203,7 +203,7 @@
           <a:p>
             <a:fld id="{695D9DF6-8DD4-DC4D-BF20-52B305DDE117}" type="datetimeFigureOut">
               <a:rPr lang="en-US" smtClean="0"/>
-              <a:t>2/19/16</a:t>
+              <a:t>2/21/16</a:t>
             </a:fld>
             <a:endParaRPr lang="en-US"/>
           </a:p>
@@ -1165,7 +1165,7 @@
             <a:fld id="{28E80666-FB37-4B36-9149-507F3B0178E3}" type="datetimeFigureOut">
               <a:rPr lang="en-US" smtClean="0"/>
               <a:pPr/>
-              <a:t>2/19/16</a:t>
+              <a:t>2/21/16</a:t>
             </a:fld>
             <a:endParaRPr lang="en-US"/>
           </a:p>
@@ -1358,7 +1358,7 @@
           <a:p>
             <a:fld id="{AAE889CD-4C40-B34C-AC1B-BDA39812A81A}" type="datetimeFigureOut">
               <a:rPr lang="en-US" smtClean="0"/>
-              <a:t>2/19/16</a:t>
+              <a:t>2/21/16</a:t>
             </a:fld>
             <a:endParaRPr lang="en-US"/>
           </a:p>
@@ -1627,7 +1627,7 @@
           <a:p>
             <a:fld id="{AAE889CD-4C40-B34C-AC1B-BDA39812A81A}" type="datetimeFigureOut">
               <a:rPr lang="en-US" smtClean="0"/>
-              <a:t>2/19/16</a:t>
+              <a:t>2/21/16</a:t>
             </a:fld>
             <a:endParaRPr lang="en-US"/>
           </a:p>
@@ -1806,7 +1806,7 @@
           <a:p>
             <a:fld id="{AAE889CD-4C40-B34C-AC1B-BDA39812A81A}" type="datetimeFigureOut">
               <a:rPr lang="en-US" smtClean="0"/>
-              <a:t>2/19/16</a:t>
+              <a:t>2/21/16</a:t>
             </a:fld>
             <a:endParaRPr lang="en-US"/>
           </a:p>
@@ -1975,7 +1975,7 @@
           <a:p>
             <a:fld id="{AAE889CD-4C40-B34C-AC1B-BDA39812A81A}" type="datetimeFigureOut">
               <a:rPr lang="en-US" smtClean="0"/>
-              <a:t>2/19/16</a:t>
+              <a:t>2/21/16</a:t>
             </a:fld>
             <a:endParaRPr lang="en-US"/>
           </a:p>
@@ -2217,7 +2217,7 @@
           <a:p>
             <a:fld id="{AAE889CD-4C40-B34C-AC1B-BDA39812A81A}" type="datetimeFigureOut">
               <a:rPr lang="en-US" smtClean="0"/>
-              <a:t>2/19/16</a:t>
+              <a:t>2/21/16</a:t>
             </a:fld>
             <a:endParaRPr lang="en-US"/>
           </a:p>
@@ -2541,7 +2541,7 @@
             <a:fld id="{28E80666-FB37-4B36-9149-507F3B0178E3}" type="datetimeFigureOut">
               <a:rPr lang="en-US" smtClean="0"/>
               <a:pPr/>
-              <a:t>2/19/16</a:t>
+              <a:t>2/21/16</a:t>
             </a:fld>
             <a:endParaRPr lang="en-US"/>
           </a:p>
@@ -2840,7 +2840,7 @@
           <a:p>
             <a:fld id="{AAE889CD-4C40-B34C-AC1B-BDA39812A81A}" type="datetimeFigureOut">
               <a:rPr lang="en-US" smtClean="0"/>
-              <a:t>2/19/16</a:t>
+              <a:t>2/21/16</a:t>
             </a:fld>
             <a:endParaRPr lang="en-US"/>
           </a:p>
@@ -3296,7 +3296,7 @@
           <a:p>
             <a:fld id="{AAE889CD-4C40-B34C-AC1B-BDA39812A81A}" type="datetimeFigureOut">
               <a:rPr lang="en-US" smtClean="0"/>
-              <a:t>2/19/16</a:t>
+              <a:t>2/21/16</a:t>
             </a:fld>
             <a:endParaRPr lang="en-US"/>
           </a:p>
@@ -3409,7 +3409,7 @@
           <a:p>
             <a:fld id="{AAE889CD-4C40-B34C-AC1B-BDA39812A81A}" type="datetimeFigureOut">
               <a:rPr lang="en-US" smtClean="0"/>
-              <a:t>2/19/16</a:t>
+              <a:t>2/21/16</a:t>
             </a:fld>
             <a:endParaRPr lang="en-US"/>
           </a:p>
@@ -3499,7 +3499,7 @@
           <a:p>
             <a:fld id="{AAE889CD-4C40-B34C-AC1B-BDA39812A81A}" type="datetimeFigureOut">
               <a:rPr lang="en-US" smtClean="0"/>
-              <a:t>2/19/16</a:t>
+              <a:t>2/21/16</a:t>
             </a:fld>
             <a:endParaRPr lang="en-US"/>
           </a:p>
@@ -3781,7 +3781,7 @@
           <a:p>
             <a:fld id="{AAE889CD-4C40-B34C-AC1B-BDA39812A81A}" type="datetimeFigureOut">
               <a:rPr lang="en-US" smtClean="0"/>
-              <a:t>2/19/16</a:t>
+              <a:t>2/21/16</a:t>
             </a:fld>
             <a:endParaRPr lang="en-US"/>
           </a:p>
@@ -3988,7 +3988,7 @@
           <a:p>
             <a:fld id="{AAE889CD-4C40-B34C-AC1B-BDA39812A81A}" type="datetimeFigureOut">
               <a:rPr lang="en-US" smtClean="0"/>
-              <a:t>2/19/16</a:t>
+              <a:t>2/21/16</a:t>
             </a:fld>
             <a:endParaRPr lang="en-US"/>
           </a:p>
@@ -9861,7 +9861,7 @@
           <p:spPr>
             <a:xfrm>
               <a:off x="6319949" y="3566491"/>
-              <a:ext cx="1858426" cy="369332"/>
+              <a:ext cx="1878714" cy="369332"/>
             </a:xfrm>
             <a:prstGeom prst="rect">
               <a:avLst/>
@@ -9875,12 +9875,16 @@
             <a:lstStyle/>
             <a:p>
               <a:r>
-                <a:rPr lang="en-US" dirty="0"/>
-                <a:t>B</a:t>
+                <a:rPr lang="en-US" dirty="0" smtClean="0"/>
+                <a:t>Front</a:t>
               </a:r>
               <a:r>
                 <a:rPr lang="en-US" dirty="0" smtClean="0"/>
-                <a:t>ack end views</a:t>
+                <a:t> </a:t>
+              </a:r>
+              <a:r>
+                <a:rPr lang="en-US" dirty="0" smtClean="0"/>
+                <a:t>end views</a:t>
               </a:r>
               <a:endParaRPr lang="en-US" dirty="0"/>
             </a:p>
@@ -10156,7 +10160,6 @@
               <a:rPr lang="en-US" dirty="0"/>
               <a:t>/2Nr4Ns</a:t>
             </a:r>
-            <a:endParaRPr lang="en-US" dirty="0"/>
           </a:p>
         </p:txBody>
       </p:sp>

</xml_diff>

<commit_message>
modify pic at slide8 in documentation
</commit_message>
<xml_diff>
--- a/philips/documentation.pptx
+++ b/philips/documentation.pptx
@@ -9224,739 +9224,716 @@
           </a:p>
         </p:txBody>
       </p:sp>
-      <p:grpSp>
-        <p:nvGrpSpPr>
-          <p:cNvPr id="32" name="Group 31"/>
-          <p:cNvGrpSpPr/>
+      <p:pic>
+        <p:nvPicPr>
+          <p:cNvPr id="3" name="Picture 2" descr="c1.png"/>
+          <p:cNvPicPr>
+            <a:picLocks noChangeAspect="1"/>
+          </p:cNvPicPr>
           <p:nvPr/>
-        </p:nvGrpSpPr>
-        <p:grpSpPr>
-          <a:xfrm>
-            <a:off x="646270" y="917342"/>
-            <a:ext cx="8377854" cy="5498118"/>
-            <a:chOff x="946150" y="917342"/>
-            <a:chExt cx="8377854" cy="5498118"/>
-          </a:xfrm>
-        </p:grpSpPr>
-        <p:pic>
-          <p:nvPicPr>
-            <p:cNvPr id="9" name="Picture 8" descr="code.png"/>
-            <p:cNvPicPr>
-              <a:picLocks noChangeAspect="1"/>
-            </p:cNvPicPr>
-            <p:nvPr/>
-          </p:nvPicPr>
-          <p:blipFill>
-            <a:blip r:embed="rId2">
-              <a:extLst>
-                <a:ext uri="{28A0092B-C50C-407E-A947-70E740481C1C}">
-                  <a14:useLocalDpi xmlns:a14="http://schemas.microsoft.com/office/drawing/2010/main" val="0"/>
-                </a:ext>
-              </a:extLst>
-            </a:blip>
-            <a:stretch>
-              <a:fillRect/>
-            </a:stretch>
-          </p:blipFill>
-          <p:spPr>
-            <a:xfrm>
-              <a:off x="946150" y="992560"/>
-              <a:ext cx="3619500" cy="5422900"/>
-            </a:xfrm>
-            <a:prstGeom prst="rect">
-              <a:avLst/>
-            </a:prstGeom>
-          </p:spPr>
-        </p:pic>
-        <p:sp>
-          <p:nvSpPr>
-            <p:cNvPr id="12" name="Rectangle 11"/>
-            <p:cNvSpPr/>
-            <p:nvPr/>
-          </p:nvSpPr>
-          <p:spPr>
-            <a:xfrm>
-              <a:off x="1543132" y="2062103"/>
-              <a:ext cx="2476555" cy="465922"/>
-            </a:xfrm>
-            <a:prstGeom prst="rect">
-              <a:avLst/>
-            </a:prstGeom>
-            <a:noFill/>
-            <a:ln w="28575" cmpd="sng">
-              <a:solidFill>
-                <a:srgbClr val="FF0000"/>
-              </a:solidFill>
-            </a:ln>
-            <a:effectLst/>
-          </p:spPr>
-          <p:style>
-            <a:lnRef idx="1">
-              <a:schemeClr val="accent1"/>
-            </a:lnRef>
-            <a:fillRef idx="3">
-              <a:schemeClr val="accent1"/>
-            </a:fillRef>
-            <a:effectRef idx="2">
-              <a:schemeClr val="accent1"/>
-            </a:effectRef>
-            <a:fontRef idx="minor">
-              <a:schemeClr val="lt1"/>
-            </a:fontRef>
-          </p:style>
-          <p:txBody>
-            <a:bodyPr rtlCol="0" anchor="ctr"/>
-            <a:lstStyle/>
-            <a:p>
-              <a:pPr algn="ctr"/>
-              <a:endParaRPr lang="en-US"/>
-            </a:p>
-          </p:txBody>
-        </p:sp>
-        <p:sp>
-          <p:nvSpPr>
-            <p:cNvPr id="13" name="Rectangle 12"/>
-            <p:cNvSpPr/>
-            <p:nvPr/>
-          </p:nvSpPr>
-          <p:spPr>
-            <a:xfrm>
-              <a:off x="1542665" y="2543727"/>
-              <a:ext cx="2477022" cy="465922"/>
-            </a:xfrm>
-            <a:prstGeom prst="rect">
-              <a:avLst/>
-            </a:prstGeom>
-            <a:noFill/>
-            <a:ln w="28575" cmpd="sng">
-              <a:solidFill>
-                <a:srgbClr val="FF0000"/>
-              </a:solidFill>
-            </a:ln>
-            <a:effectLst/>
-          </p:spPr>
-          <p:style>
-            <a:lnRef idx="1">
-              <a:schemeClr val="accent1"/>
-            </a:lnRef>
-            <a:fillRef idx="3">
-              <a:schemeClr val="accent1"/>
-            </a:fillRef>
-            <a:effectRef idx="2">
-              <a:schemeClr val="accent1"/>
-            </a:effectRef>
-            <a:fontRef idx="minor">
-              <a:schemeClr val="lt1"/>
-            </a:fontRef>
-          </p:style>
-          <p:txBody>
-            <a:bodyPr rtlCol="0" anchor="ctr"/>
-            <a:lstStyle/>
-            <a:p>
-              <a:pPr algn="ctr"/>
-              <a:endParaRPr lang="en-US"/>
-            </a:p>
-          </p:txBody>
-        </p:sp>
-        <p:sp>
-          <p:nvSpPr>
-            <p:cNvPr id="14" name="Rectangle 13"/>
-            <p:cNvSpPr/>
-            <p:nvPr/>
-          </p:nvSpPr>
-          <p:spPr>
-            <a:xfrm>
-              <a:off x="1342298" y="3848434"/>
-              <a:ext cx="1656217" cy="831349"/>
-            </a:xfrm>
-            <a:prstGeom prst="rect">
-              <a:avLst/>
-            </a:prstGeom>
-            <a:noFill/>
-            <a:ln w="28575" cmpd="sng">
-              <a:solidFill>
-                <a:srgbClr val="FF0000"/>
-              </a:solidFill>
-            </a:ln>
-            <a:effectLst/>
-          </p:spPr>
-          <p:style>
-            <a:lnRef idx="1">
-              <a:schemeClr val="accent1"/>
-            </a:lnRef>
-            <a:fillRef idx="3">
-              <a:schemeClr val="accent1"/>
-            </a:fillRef>
-            <a:effectRef idx="2">
-              <a:schemeClr val="accent1"/>
-            </a:effectRef>
-            <a:fontRef idx="minor">
-              <a:schemeClr val="lt1"/>
-            </a:fontRef>
-          </p:style>
-          <p:txBody>
-            <a:bodyPr rtlCol="0" anchor="ctr"/>
-            <a:lstStyle/>
-            <a:p>
-              <a:pPr algn="ctr"/>
-              <a:endParaRPr lang="en-US"/>
-            </a:p>
-          </p:txBody>
-        </p:sp>
-        <p:sp>
-          <p:nvSpPr>
-            <p:cNvPr id="15" name="Rectangle 14"/>
-            <p:cNvSpPr/>
-            <p:nvPr/>
-          </p:nvSpPr>
-          <p:spPr>
-            <a:xfrm>
-              <a:off x="1342298" y="5141384"/>
-              <a:ext cx="1656217" cy="831349"/>
-            </a:xfrm>
-            <a:prstGeom prst="rect">
-              <a:avLst/>
-            </a:prstGeom>
-            <a:noFill/>
-            <a:ln w="28575" cmpd="sng">
-              <a:solidFill>
-                <a:srgbClr val="FF0000"/>
-              </a:solidFill>
-            </a:ln>
-            <a:effectLst/>
-          </p:spPr>
-          <p:style>
-            <a:lnRef idx="1">
-              <a:schemeClr val="accent1"/>
-            </a:lnRef>
-            <a:fillRef idx="3">
-              <a:schemeClr val="accent1"/>
-            </a:fillRef>
-            <a:effectRef idx="2">
-              <a:schemeClr val="accent1"/>
-            </a:effectRef>
-            <a:fontRef idx="minor">
-              <a:schemeClr val="lt1"/>
-            </a:fontRef>
-          </p:style>
-          <p:txBody>
-            <a:bodyPr rtlCol="0" anchor="ctr"/>
-            <a:lstStyle/>
-            <a:p>
-              <a:pPr algn="ctr"/>
-              <a:endParaRPr lang="en-US"/>
-            </a:p>
-          </p:txBody>
-        </p:sp>
-        <p:sp>
-          <p:nvSpPr>
-            <p:cNvPr id="16" name="Rectangle 15"/>
-            <p:cNvSpPr/>
-            <p:nvPr/>
-          </p:nvSpPr>
-          <p:spPr>
-            <a:xfrm>
-              <a:off x="1118413" y="3585159"/>
-              <a:ext cx="2901273" cy="2599681"/>
-            </a:xfrm>
-            <a:prstGeom prst="rect">
-              <a:avLst/>
-            </a:prstGeom>
-            <a:noFill/>
-            <a:ln w="28575" cmpd="sng">
-              <a:solidFill>
-                <a:srgbClr val="FF0000"/>
-              </a:solidFill>
-            </a:ln>
-            <a:effectLst/>
-          </p:spPr>
-          <p:style>
-            <a:lnRef idx="1">
-              <a:schemeClr val="accent1"/>
-            </a:lnRef>
-            <a:fillRef idx="3">
-              <a:schemeClr val="accent1"/>
-            </a:fillRef>
-            <a:effectRef idx="2">
-              <a:schemeClr val="accent1"/>
-            </a:effectRef>
-            <a:fontRef idx="minor">
-              <a:schemeClr val="lt1"/>
-            </a:fontRef>
-          </p:style>
-          <p:txBody>
-            <a:bodyPr rtlCol="0" anchor="ctr"/>
-            <a:lstStyle/>
-            <a:p>
-              <a:pPr algn="ctr"/>
-              <a:endParaRPr lang="en-US"/>
-            </a:p>
-          </p:txBody>
-        </p:sp>
-        <p:sp>
-          <p:nvSpPr>
-            <p:cNvPr id="17" name="Rectangle 16"/>
-            <p:cNvSpPr/>
-            <p:nvPr/>
-          </p:nvSpPr>
-          <p:spPr>
-            <a:xfrm>
-              <a:off x="946150" y="992560"/>
-              <a:ext cx="3073536" cy="287985"/>
-            </a:xfrm>
-            <a:prstGeom prst="rect">
-              <a:avLst/>
-            </a:prstGeom>
-            <a:noFill/>
-            <a:ln w="28575" cmpd="sng">
-              <a:solidFill>
-                <a:srgbClr val="FF0000"/>
-              </a:solidFill>
-            </a:ln>
-            <a:effectLst/>
-          </p:spPr>
-          <p:style>
-            <a:lnRef idx="1">
-              <a:schemeClr val="accent1"/>
-            </a:lnRef>
-            <a:fillRef idx="3">
-              <a:schemeClr val="accent1"/>
-            </a:fillRef>
-            <a:effectRef idx="2">
-              <a:schemeClr val="accent1"/>
-            </a:effectRef>
-            <a:fontRef idx="minor">
-              <a:schemeClr val="lt1"/>
-            </a:fontRef>
-          </p:style>
-          <p:txBody>
-            <a:bodyPr rtlCol="0" anchor="ctr"/>
-            <a:lstStyle/>
-            <a:p>
-              <a:pPr algn="ctr"/>
-              <a:endParaRPr lang="en-US"/>
-            </a:p>
-          </p:txBody>
-        </p:sp>
-        <p:cxnSp>
-          <p:nvCxnSpPr>
-            <p:cNvPr id="19" name="Straight Arrow Connector 18"/>
-            <p:cNvCxnSpPr/>
-            <p:nvPr/>
-          </p:nvCxnSpPr>
-          <p:spPr>
-            <a:xfrm>
-              <a:off x="4019687" y="1112605"/>
-              <a:ext cx="1626766" cy="0"/>
-            </a:xfrm>
-            <a:prstGeom prst="straightConnector1">
-              <a:avLst/>
-            </a:prstGeom>
-            <a:ln w="28575" cmpd="sng">
-              <a:solidFill>
-                <a:srgbClr val="FF0000"/>
-              </a:solidFill>
-              <a:tailEnd type="arrow"/>
-            </a:ln>
-          </p:spPr>
-          <p:style>
-            <a:lnRef idx="2">
-              <a:schemeClr val="accent1"/>
-            </a:lnRef>
-            <a:fillRef idx="0">
-              <a:schemeClr val="accent1"/>
-            </a:fillRef>
-            <a:effectRef idx="1">
-              <a:schemeClr val="accent1"/>
-            </a:effectRef>
-            <a:fontRef idx="minor">
-              <a:schemeClr val="tx1"/>
-            </a:fontRef>
-          </p:style>
-        </p:cxnSp>
-        <p:cxnSp>
-          <p:nvCxnSpPr>
-            <p:cNvPr id="20" name="Straight Arrow Connector 19"/>
-            <p:cNvCxnSpPr/>
-            <p:nvPr/>
-          </p:nvCxnSpPr>
-          <p:spPr>
-            <a:xfrm>
-              <a:off x="4019686" y="2305834"/>
-              <a:ext cx="2207142" cy="0"/>
-            </a:xfrm>
-            <a:prstGeom prst="straightConnector1">
-              <a:avLst/>
-            </a:prstGeom>
-            <a:ln w="28575" cmpd="sng">
-              <a:solidFill>
-                <a:srgbClr val="FF0000"/>
-              </a:solidFill>
-              <a:tailEnd type="arrow"/>
-            </a:ln>
-          </p:spPr>
-          <p:style>
-            <a:lnRef idx="2">
-              <a:schemeClr val="accent1"/>
-            </a:lnRef>
-            <a:fillRef idx="0">
-              <a:schemeClr val="accent1"/>
-            </a:fillRef>
-            <a:effectRef idx="1">
-              <a:schemeClr val="accent1"/>
-            </a:effectRef>
-            <a:fontRef idx="minor">
-              <a:schemeClr val="tx1"/>
-            </a:fontRef>
-          </p:style>
-        </p:cxnSp>
-        <p:cxnSp>
-          <p:nvCxnSpPr>
-            <p:cNvPr id="22" name="Straight Arrow Connector 21"/>
-            <p:cNvCxnSpPr/>
-            <p:nvPr/>
-          </p:nvCxnSpPr>
-          <p:spPr>
-            <a:xfrm>
-              <a:off x="4019687" y="2846340"/>
-              <a:ext cx="2207142" cy="0"/>
-            </a:xfrm>
-            <a:prstGeom prst="straightConnector1">
-              <a:avLst/>
-            </a:prstGeom>
-            <a:ln w="28575" cmpd="sng">
-              <a:solidFill>
-                <a:srgbClr val="FF0000"/>
-              </a:solidFill>
-              <a:tailEnd type="arrow"/>
-            </a:ln>
-          </p:spPr>
-          <p:style>
-            <a:lnRef idx="2">
-              <a:schemeClr val="accent1"/>
-            </a:lnRef>
-            <a:fillRef idx="0">
-              <a:schemeClr val="accent1"/>
-            </a:fillRef>
-            <a:effectRef idx="1">
-              <a:schemeClr val="accent1"/>
-            </a:effectRef>
-            <a:fontRef idx="minor">
-              <a:schemeClr val="tx1"/>
-            </a:fontRef>
-          </p:style>
-        </p:cxnSp>
-        <p:cxnSp>
-          <p:nvCxnSpPr>
-            <p:cNvPr id="23" name="Straight Arrow Connector 22"/>
-            <p:cNvCxnSpPr/>
-            <p:nvPr/>
-          </p:nvCxnSpPr>
-          <p:spPr>
-            <a:xfrm>
-              <a:off x="4019687" y="3777613"/>
-              <a:ext cx="2207142" cy="0"/>
-            </a:xfrm>
-            <a:prstGeom prst="straightConnector1">
-              <a:avLst/>
-            </a:prstGeom>
-            <a:ln w="28575" cmpd="sng">
-              <a:solidFill>
-                <a:srgbClr val="FF0000"/>
-              </a:solidFill>
-              <a:tailEnd type="arrow"/>
-            </a:ln>
-          </p:spPr>
-          <p:style>
-            <a:lnRef idx="2">
-              <a:schemeClr val="accent1"/>
-            </a:lnRef>
-            <a:fillRef idx="0">
-              <a:schemeClr val="accent1"/>
-            </a:fillRef>
-            <a:effectRef idx="1">
-              <a:schemeClr val="accent1"/>
-            </a:effectRef>
-            <a:fontRef idx="minor">
-              <a:schemeClr val="tx1"/>
-            </a:fontRef>
-          </p:style>
-        </p:cxnSp>
-        <p:cxnSp>
-          <p:nvCxnSpPr>
-            <p:cNvPr id="24" name="Straight Arrow Connector 23"/>
-            <p:cNvCxnSpPr/>
-            <p:nvPr/>
-          </p:nvCxnSpPr>
-          <p:spPr>
-            <a:xfrm>
-              <a:off x="3027094" y="4321827"/>
-              <a:ext cx="3910088" cy="0"/>
-            </a:xfrm>
-            <a:prstGeom prst="straightConnector1">
-              <a:avLst/>
-            </a:prstGeom>
-            <a:ln w="28575" cmpd="sng">
-              <a:solidFill>
-                <a:srgbClr val="FF0000"/>
-              </a:solidFill>
-              <a:tailEnd type="arrow"/>
-            </a:ln>
-          </p:spPr>
-          <p:style>
-            <a:lnRef idx="2">
-              <a:schemeClr val="accent1"/>
-            </a:lnRef>
-            <a:fillRef idx="0">
-              <a:schemeClr val="accent1"/>
-            </a:fillRef>
-            <a:effectRef idx="1">
-              <a:schemeClr val="accent1"/>
-            </a:effectRef>
-            <a:fontRef idx="minor">
-              <a:schemeClr val="tx1"/>
-            </a:fontRef>
-          </p:style>
-        </p:cxnSp>
-        <p:cxnSp>
-          <p:nvCxnSpPr>
-            <p:cNvPr id="25" name="Straight Arrow Connector 24"/>
-            <p:cNvCxnSpPr/>
-            <p:nvPr/>
-          </p:nvCxnSpPr>
-          <p:spPr>
-            <a:xfrm>
-              <a:off x="2998515" y="5532696"/>
-              <a:ext cx="3910088" cy="0"/>
-            </a:xfrm>
-            <a:prstGeom prst="straightConnector1">
-              <a:avLst/>
-            </a:prstGeom>
-            <a:ln w="28575" cmpd="sng">
-              <a:solidFill>
-                <a:srgbClr val="FF0000"/>
-              </a:solidFill>
-              <a:tailEnd type="arrow"/>
-            </a:ln>
-          </p:spPr>
-          <p:style>
-            <a:lnRef idx="2">
-              <a:schemeClr val="accent1"/>
-            </a:lnRef>
-            <a:fillRef idx="0">
-              <a:schemeClr val="accent1"/>
-            </a:fillRef>
-            <a:effectRef idx="1">
-              <a:schemeClr val="accent1"/>
-            </a:effectRef>
-            <a:fontRef idx="minor">
-              <a:schemeClr val="tx1"/>
-            </a:fontRef>
-          </p:style>
-        </p:cxnSp>
-        <p:sp>
-          <p:nvSpPr>
-            <p:cNvPr id="26" name="TextBox 25"/>
-            <p:cNvSpPr txBox="1"/>
-            <p:nvPr/>
-          </p:nvSpPr>
-          <p:spPr>
-            <a:xfrm>
-              <a:off x="5662356" y="917342"/>
-              <a:ext cx="1642246" cy="369332"/>
-            </a:xfrm>
-            <a:prstGeom prst="rect">
-              <a:avLst/>
-            </a:prstGeom>
-            <a:noFill/>
-          </p:spPr>
-          <p:txBody>
-            <a:bodyPr wrap="none" rtlCol="0">
-              <a:spAutoFit/>
-            </a:bodyPr>
-            <a:lstStyle/>
-            <a:p>
-              <a:r>
-                <a:rPr lang="en-US" dirty="0" smtClean="0"/>
-                <a:t>Project name</a:t>
-              </a:r>
-              <a:endParaRPr lang="en-US" dirty="0"/>
-            </a:p>
-          </p:txBody>
-        </p:sp>
-        <p:sp>
-          <p:nvSpPr>
-            <p:cNvPr id="27" name="TextBox 26"/>
-            <p:cNvSpPr txBox="1"/>
-            <p:nvPr/>
-          </p:nvSpPr>
-          <p:spPr>
-            <a:xfrm>
-              <a:off x="6226829" y="2097385"/>
-              <a:ext cx="2570874" cy="369332"/>
-            </a:xfrm>
-            <a:prstGeom prst="rect">
-              <a:avLst/>
-            </a:prstGeom>
-            <a:noFill/>
-          </p:spPr>
-          <p:txBody>
-            <a:bodyPr wrap="none" rtlCol="0">
-              <a:spAutoFit/>
-            </a:bodyPr>
-            <a:lstStyle/>
-            <a:p>
-              <a:r>
-                <a:rPr lang="en-US" dirty="0"/>
-                <a:t>B</a:t>
-              </a:r>
-              <a:r>
-                <a:rPr lang="en-US" dirty="0" smtClean="0"/>
-                <a:t>ack end model, Java</a:t>
-              </a:r>
-              <a:endParaRPr lang="en-US" dirty="0"/>
-            </a:p>
-          </p:txBody>
-        </p:sp>
-        <p:sp>
-          <p:nvSpPr>
-            <p:cNvPr id="28" name="TextBox 27"/>
-            <p:cNvSpPr txBox="1"/>
-            <p:nvPr/>
-          </p:nvSpPr>
-          <p:spPr>
-            <a:xfrm>
-              <a:off x="6255749" y="2673169"/>
-              <a:ext cx="2913065" cy="369332"/>
-            </a:xfrm>
-            <a:prstGeom prst="rect">
-              <a:avLst/>
-            </a:prstGeom>
-            <a:noFill/>
-          </p:spPr>
-          <p:txBody>
-            <a:bodyPr wrap="none" rtlCol="0">
-              <a:spAutoFit/>
-            </a:bodyPr>
-            <a:lstStyle/>
-            <a:p>
-              <a:r>
-                <a:rPr lang="en-US" dirty="0"/>
-                <a:t>B</a:t>
-              </a:r>
-              <a:r>
-                <a:rPr lang="en-US" dirty="0" smtClean="0"/>
-                <a:t>ack end controller, Java</a:t>
-              </a:r>
-              <a:endParaRPr lang="en-US" dirty="0"/>
-            </a:p>
-          </p:txBody>
-        </p:sp>
-        <p:sp>
-          <p:nvSpPr>
-            <p:cNvPr id="29" name="TextBox 28"/>
-            <p:cNvSpPr txBox="1"/>
-            <p:nvPr/>
-          </p:nvSpPr>
-          <p:spPr>
-            <a:xfrm>
-              <a:off x="6319949" y="3566491"/>
-              <a:ext cx="1878714" cy="369332"/>
-            </a:xfrm>
-            <a:prstGeom prst="rect">
-              <a:avLst/>
-            </a:prstGeom>
-            <a:noFill/>
-          </p:spPr>
-          <p:txBody>
-            <a:bodyPr wrap="none" rtlCol="0">
-              <a:spAutoFit/>
-            </a:bodyPr>
-            <a:lstStyle/>
-            <a:p>
-              <a:r>
-                <a:rPr lang="en-US" dirty="0" smtClean="0"/>
-                <a:t>Front</a:t>
-              </a:r>
-              <a:r>
-                <a:rPr lang="en-US" dirty="0" smtClean="0"/>
-                <a:t> </a:t>
-              </a:r>
-              <a:r>
-                <a:rPr lang="en-US" dirty="0" smtClean="0"/>
-                <a:t>end views</a:t>
-              </a:r>
-              <a:endParaRPr lang="en-US" dirty="0"/>
-            </a:p>
-          </p:txBody>
-        </p:sp>
-        <p:sp>
-          <p:nvSpPr>
-            <p:cNvPr id="30" name="TextBox 29"/>
-            <p:cNvSpPr txBox="1"/>
-            <p:nvPr/>
-          </p:nvSpPr>
-          <p:spPr>
-            <a:xfrm>
-              <a:off x="6884262" y="4101879"/>
-              <a:ext cx="2397298" cy="369332"/>
-            </a:xfrm>
-            <a:prstGeom prst="rect">
-              <a:avLst/>
-            </a:prstGeom>
-            <a:noFill/>
-          </p:spPr>
-          <p:txBody>
-            <a:bodyPr wrap="none" rtlCol="0">
-              <a:spAutoFit/>
-            </a:bodyPr>
-            <a:lstStyle/>
-            <a:p>
-              <a:r>
-                <a:rPr lang="en-US" dirty="0"/>
-                <a:t>V</a:t>
-              </a:r>
-              <a:r>
-                <a:rPr lang="en-US" dirty="0" smtClean="0"/>
-                <a:t>iews styling, CSS…</a:t>
-              </a:r>
-            </a:p>
-          </p:txBody>
-        </p:sp>
-        <p:sp>
-          <p:nvSpPr>
-            <p:cNvPr id="31" name="TextBox 30"/>
-            <p:cNvSpPr txBox="1"/>
-            <p:nvPr/>
-          </p:nvSpPr>
-          <p:spPr>
-            <a:xfrm>
-              <a:off x="6877902" y="5312748"/>
-              <a:ext cx="2446102" cy="369332"/>
-            </a:xfrm>
-            <a:prstGeom prst="rect">
-              <a:avLst/>
-            </a:prstGeom>
-            <a:noFill/>
-          </p:spPr>
-          <p:txBody>
-            <a:bodyPr wrap="none" rtlCol="0">
-              <a:spAutoFit/>
-            </a:bodyPr>
-            <a:lstStyle/>
-            <a:p>
-              <a:r>
-                <a:rPr lang="en-US" dirty="0"/>
-                <a:t>V</a:t>
-              </a:r>
-              <a:r>
-                <a:rPr lang="en-US" dirty="0" smtClean="0"/>
-                <a:t>iews source, html…</a:t>
-              </a:r>
-            </a:p>
-          </p:txBody>
-        </p:sp>
-      </p:grpSp>
+        </p:nvPicPr>
+        <p:blipFill>
+          <a:blip r:embed="rId2">
+            <a:extLst>
+              <a:ext uri="{28A0092B-C50C-407E-A947-70E740481C1C}">
+                <a14:useLocalDpi xmlns:a14="http://schemas.microsoft.com/office/drawing/2010/main" val="0"/>
+              </a:ext>
+            </a:extLst>
+          </a:blip>
+          <a:stretch>
+            <a:fillRect/>
+          </a:stretch>
+        </p:blipFill>
+        <p:spPr>
+          <a:xfrm>
+            <a:off x="615307" y="855391"/>
+            <a:ext cx="3797300" cy="5842000"/>
+          </a:xfrm>
+          <a:prstGeom prst="rect">
+            <a:avLst/>
+          </a:prstGeom>
+        </p:spPr>
+      </p:pic>
+      <p:sp>
+        <p:nvSpPr>
+          <p:cNvPr id="51" name="Rectangle 50"/>
+          <p:cNvSpPr/>
+          <p:nvPr/>
+        </p:nvSpPr>
+        <p:spPr>
+          <a:xfrm>
+            <a:off x="1243252" y="1733633"/>
+            <a:ext cx="2476555" cy="465922"/>
+          </a:xfrm>
+          <a:prstGeom prst="rect">
+            <a:avLst/>
+          </a:prstGeom>
+          <a:noFill/>
+          <a:ln w="28575" cmpd="sng">
+            <a:solidFill>
+              <a:srgbClr val="FF0000"/>
+            </a:solidFill>
+          </a:ln>
+          <a:effectLst/>
+        </p:spPr>
+        <p:style>
+          <a:lnRef idx="1">
+            <a:schemeClr val="accent1"/>
+          </a:lnRef>
+          <a:fillRef idx="3">
+            <a:schemeClr val="accent1"/>
+          </a:fillRef>
+          <a:effectRef idx="2">
+            <a:schemeClr val="accent1"/>
+          </a:effectRef>
+          <a:fontRef idx="minor">
+            <a:schemeClr val="lt1"/>
+          </a:fontRef>
+        </p:style>
+        <p:txBody>
+          <a:bodyPr rtlCol="0" anchor="ctr"/>
+          <a:lstStyle/>
+          <a:p>
+            <a:pPr algn="ctr"/>
+            <a:endParaRPr lang="en-US"/>
+          </a:p>
+        </p:txBody>
+      </p:sp>
+      <p:sp>
+        <p:nvSpPr>
+          <p:cNvPr id="52" name="Rectangle 51"/>
+          <p:cNvSpPr/>
+          <p:nvPr/>
+        </p:nvSpPr>
+        <p:spPr>
+          <a:xfrm>
+            <a:off x="1242785" y="2182410"/>
+            <a:ext cx="2477022" cy="465922"/>
+          </a:xfrm>
+          <a:prstGeom prst="rect">
+            <a:avLst/>
+          </a:prstGeom>
+          <a:noFill/>
+          <a:ln w="28575" cmpd="sng">
+            <a:solidFill>
+              <a:srgbClr val="FF0000"/>
+            </a:solidFill>
+          </a:ln>
+          <a:effectLst/>
+        </p:spPr>
+        <p:style>
+          <a:lnRef idx="1">
+            <a:schemeClr val="accent1"/>
+          </a:lnRef>
+          <a:fillRef idx="3">
+            <a:schemeClr val="accent1"/>
+          </a:fillRef>
+          <a:effectRef idx="2">
+            <a:schemeClr val="accent1"/>
+          </a:effectRef>
+          <a:fontRef idx="minor">
+            <a:schemeClr val="lt1"/>
+          </a:fontRef>
+        </p:style>
+        <p:txBody>
+          <a:bodyPr rtlCol="0" anchor="ctr"/>
+          <a:lstStyle/>
+          <a:p>
+            <a:pPr algn="ctr"/>
+            <a:endParaRPr lang="en-US"/>
+          </a:p>
+        </p:txBody>
+      </p:sp>
+      <p:sp>
+        <p:nvSpPr>
+          <p:cNvPr id="53" name="Rectangle 52"/>
+          <p:cNvSpPr/>
+          <p:nvPr/>
+        </p:nvSpPr>
+        <p:spPr>
+          <a:xfrm>
+            <a:off x="1042418" y="3892230"/>
+            <a:ext cx="1656217" cy="831349"/>
+          </a:xfrm>
+          <a:prstGeom prst="rect">
+            <a:avLst/>
+          </a:prstGeom>
+          <a:noFill/>
+          <a:ln w="28575" cmpd="sng">
+            <a:solidFill>
+              <a:srgbClr val="FF0000"/>
+            </a:solidFill>
+          </a:ln>
+          <a:effectLst/>
+        </p:spPr>
+        <p:style>
+          <a:lnRef idx="1">
+            <a:schemeClr val="accent1"/>
+          </a:lnRef>
+          <a:fillRef idx="3">
+            <a:schemeClr val="accent1"/>
+          </a:fillRef>
+          <a:effectRef idx="2">
+            <a:schemeClr val="accent1"/>
+          </a:effectRef>
+          <a:fontRef idx="minor">
+            <a:schemeClr val="lt1"/>
+          </a:fontRef>
+        </p:style>
+        <p:txBody>
+          <a:bodyPr rtlCol="0" anchor="ctr"/>
+          <a:lstStyle/>
+          <a:p>
+            <a:pPr algn="ctr"/>
+            <a:endParaRPr lang="en-US"/>
+          </a:p>
+        </p:txBody>
+      </p:sp>
+      <p:sp>
+        <p:nvSpPr>
+          <p:cNvPr id="54" name="Rectangle 53"/>
+          <p:cNvSpPr/>
+          <p:nvPr/>
+        </p:nvSpPr>
+        <p:spPr>
+          <a:xfrm>
+            <a:off x="1075262" y="5009996"/>
+            <a:ext cx="1656217" cy="831349"/>
+          </a:xfrm>
+          <a:prstGeom prst="rect">
+            <a:avLst/>
+          </a:prstGeom>
+          <a:noFill/>
+          <a:ln w="28575" cmpd="sng">
+            <a:solidFill>
+              <a:srgbClr val="FF0000"/>
+            </a:solidFill>
+          </a:ln>
+          <a:effectLst/>
+        </p:spPr>
+        <p:style>
+          <a:lnRef idx="1">
+            <a:schemeClr val="accent1"/>
+          </a:lnRef>
+          <a:fillRef idx="3">
+            <a:schemeClr val="accent1"/>
+          </a:fillRef>
+          <a:effectRef idx="2">
+            <a:schemeClr val="accent1"/>
+          </a:effectRef>
+          <a:fontRef idx="minor">
+            <a:schemeClr val="lt1"/>
+          </a:fontRef>
+        </p:style>
+        <p:txBody>
+          <a:bodyPr rtlCol="0" anchor="ctr"/>
+          <a:lstStyle/>
+          <a:p>
+            <a:pPr algn="ctr"/>
+            <a:endParaRPr lang="en-US"/>
+          </a:p>
+        </p:txBody>
+      </p:sp>
+      <p:sp>
+        <p:nvSpPr>
+          <p:cNvPr id="55" name="Rectangle 54"/>
+          <p:cNvSpPr/>
+          <p:nvPr/>
+        </p:nvSpPr>
+        <p:spPr>
+          <a:xfrm>
+            <a:off x="818533" y="3692377"/>
+            <a:ext cx="2901273" cy="2363346"/>
+          </a:xfrm>
+          <a:prstGeom prst="rect">
+            <a:avLst/>
+          </a:prstGeom>
+          <a:noFill/>
+          <a:ln w="28575" cmpd="sng">
+            <a:solidFill>
+              <a:srgbClr val="FF0000"/>
+            </a:solidFill>
+          </a:ln>
+          <a:effectLst/>
+        </p:spPr>
+        <p:style>
+          <a:lnRef idx="1">
+            <a:schemeClr val="accent1"/>
+          </a:lnRef>
+          <a:fillRef idx="3">
+            <a:schemeClr val="accent1"/>
+          </a:fillRef>
+          <a:effectRef idx="2">
+            <a:schemeClr val="accent1"/>
+          </a:effectRef>
+          <a:fontRef idx="minor">
+            <a:schemeClr val="lt1"/>
+          </a:fontRef>
+        </p:style>
+        <p:txBody>
+          <a:bodyPr rtlCol="0" anchor="ctr"/>
+          <a:lstStyle/>
+          <a:p>
+            <a:pPr algn="ctr"/>
+            <a:endParaRPr lang="en-US"/>
+          </a:p>
+        </p:txBody>
+      </p:sp>
+      <p:sp>
+        <p:nvSpPr>
+          <p:cNvPr id="56" name="Rectangle 55"/>
+          <p:cNvSpPr/>
+          <p:nvPr/>
+        </p:nvSpPr>
+        <p:spPr>
+          <a:xfrm>
+            <a:off x="625631" y="824620"/>
+            <a:ext cx="3073536" cy="287985"/>
+          </a:xfrm>
+          <a:prstGeom prst="rect">
+            <a:avLst/>
+          </a:prstGeom>
+          <a:noFill/>
+          <a:ln w="28575" cmpd="sng">
+            <a:solidFill>
+              <a:srgbClr val="FF0000"/>
+            </a:solidFill>
+          </a:ln>
+          <a:effectLst/>
+        </p:spPr>
+        <p:style>
+          <a:lnRef idx="1">
+            <a:schemeClr val="accent1"/>
+          </a:lnRef>
+          <a:fillRef idx="3">
+            <a:schemeClr val="accent1"/>
+          </a:fillRef>
+          <a:effectRef idx="2">
+            <a:schemeClr val="accent1"/>
+          </a:effectRef>
+          <a:fontRef idx="minor">
+            <a:schemeClr val="lt1"/>
+          </a:fontRef>
+        </p:style>
+        <p:txBody>
+          <a:bodyPr rtlCol="0" anchor="ctr"/>
+          <a:lstStyle/>
+          <a:p>
+            <a:pPr algn="ctr"/>
+            <a:endParaRPr lang="en-US"/>
+          </a:p>
+        </p:txBody>
+      </p:sp>
+      <p:cxnSp>
+        <p:nvCxnSpPr>
+          <p:cNvPr id="57" name="Straight Arrow Connector 56"/>
+          <p:cNvCxnSpPr/>
+          <p:nvPr/>
+        </p:nvCxnSpPr>
+        <p:spPr>
+          <a:xfrm>
+            <a:off x="3719807" y="1025013"/>
+            <a:ext cx="1626766" cy="0"/>
+          </a:xfrm>
+          <a:prstGeom prst="straightConnector1">
+            <a:avLst/>
+          </a:prstGeom>
+          <a:ln w="28575" cmpd="sng">
+            <a:solidFill>
+              <a:srgbClr val="FF0000"/>
+            </a:solidFill>
+            <a:tailEnd type="arrow"/>
+          </a:ln>
+        </p:spPr>
+        <p:style>
+          <a:lnRef idx="2">
+            <a:schemeClr val="accent1"/>
+          </a:lnRef>
+          <a:fillRef idx="0">
+            <a:schemeClr val="accent1"/>
+          </a:fillRef>
+          <a:effectRef idx="1">
+            <a:schemeClr val="accent1"/>
+          </a:effectRef>
+          <a:fontRef idx="minor">
+            <a:schemeClr val="tx1"/>
+          </a:fontRef>
+        </p:style>
+      </p:cxnSp>
+      <p:cxnSp>
+        <p:nvCxnSpPr>
+          <p:cNvPr id="58" name="Straight Arrow Connector 57"/>
+          <p:cNvCxnSpPr/>
+          <p:nvPr/>
+        </p:nvCxnSpPr>
+        <p:spPr>
+          <a:xfrm>
+            <a:off x="3719806" y="1966415"/>
+            <a:ext cx="2207142" cy="0"/>
+          </a:xfrm>
+          <a:prstGeom prst="straightConnector1">
+            <a:avLst/>
+          </a:prstGeom>
+          <a:ln w="28575" cmpd="sng">
+            <a:solidFill>
+              <a:srgbClr val="FF0000"/>
+            </a:solidFill>
+            <a:tailEnd type="arrow"/>
+          </a:ln>
+        </p:spPr>
+        <p:style>
+          <a:lnRef idx="2">
+            <a:schemeClr val="accent1"/>
+          </a:lnRef>
+          <a:fillRef idx="0">
+            <a:schemeClr val="accent1"/>
+          </a:fillRef>
+          <a:effectRef idx="1">
+            <a:schemeClr val="accent1"/>
+          </a:effectRef>
+          <a:fontRef idx="minor">
+            <a:schemeClr val="tx1"/>
+          </a:fontRef>
+        </p:style>
+      </p:cxnSp>
+      <p:cxnSp>
+        <p:nvCxnSpPr>
+          <p:cNvPr id="59" name="Straight Arrow Connector 58"/>
+          <p:cNvCxnSpPr/>
+          <p:nvPr/>
+        </p:nvCxnSpPr>
+        <p:spPr>
+          <a:xfrm>
+            <a:off x="3719807" y="2452187"/>
+            <a:ext cx="2207142" cy="0"/>
+          </a:xfrm>
+          <a:prstGeom prst="straightConnector1">
+            <a:avLst/>
+          </a:prstGeom>
+          <a:ln w="28575" cmpd="sng">
+            <a:solidFill>
+              <a:srgbClr val="FF0000"/>
+            </a:solidFill>
+            <a:tailEnd type="arrow"/>
+          </a:ln>
+        </p:spPr>
+        <p:style>
+          <a:lnRef idx="2">
+            <a:schemeClr val="accent1"/>
+          </a:lnRef>
+          <a:fillRef idx="0">
+            <a:schemeClr val="accent1"/>
+          </a:fillRef>
+          <a:effectRef idx="1">
+            <a:schemeClr val="accent1"/>
+          </a:effectRef>
+          <a:fontRef idx="minor">
+            <a:schemeClr val="tx1"/>
+          </a:fontRef>
+        </p:style>
+      </p:cxnSp>
+      <p:cxnSp>
+        <p:nvCxnSpPr>
+          <p:cNvPr id="60" name="Straight Arrow Connector 59"/>
+          <p:cNvCxnSpPr/>
+          <p:nvPr/>
+        </p:nvCxnSpPr>
+        <p:spPr>
+          <a:xfrm>
+            <a:off x="3719807" y="3777613"/>
+            <a:ext cx="2207142" cy="0"/>
+          </a:xfrm>
+          <a:prstGeom prst="straightConnector1">
+            <a:avLst/>
+          </a:prstGeom>
+          <a:ln w="28575" cmpd="sng">
+            <a:solidFill>
+              <a:srgbClr val="FF0000"/>
+            </a:solidFill>
+            <a:tailEnd type="arrow"/>
+          </a:ln>
+        </p:spPr>
+        <p:style>
+          <a:lnRef idx="2">
+            <a:schemeClr val="accent1"/>
+          </a:lnRef>
+          <a:fillRef idx="0">
+            <a:schemeClr val="accent1"/>
+          </a:fillRef>
+          <a:effectRef idx="1">
+            <a:schemeClr val="accent1"/>
+          </a:effectRef>
+          <a:fontRef idx="minor">
+            <a:schemeClr val="tx1"/>
+          </a:fontRef>
+        </p:style>
+      </p:cxnSp>
+      <p:cxnSp>
+        <p:nvCxnSpPr>
+          <p:cNvPr id="61" name="Straight Arrow Connector 60"/>
+          <p:cNvCxnSpPr/>
+          <p:nvPr/>
+        </p:nvCxnSpPr>
+        <p:spPr>
+          <a:xfrm>
+            <a:off x="2727214" y="4321827"/>
+            <a:ext cx="3910088" cy="0"/>
+          </a:xfrm>
+          <a:prstGeom prst="straightConnector1">
+            <a:avLst/>
+          </a:prstGeom>
+          <a:ln w="28575" cmpd="sng">
+            <a:solidFill>
+              <a:srgbClr val="FF0000"/>
+            </a:solidFill>
+            <a:tailEnd type="arrow"/>
+          </a:ln>
+        </p:spPr>
+        <p:style>
+          <a:lnRef idx="2">
+            <a:schemeClr val="accent1"/>
+          </a:lnRef>
+          <a:fillRef idx="0">
+            <a:schemeClr val="accent1"/>
+          </a:fillRef>
+          <a:effectRef idx="1">
+            <a:schemeClr val="accent1"/>
+          </a:effectRef>
+          <a:fontRef idx="minor">
+            <a:schemeClr val="tx1"/>
+          </a:fontRef>
+        </p:style>
+      </p:cxnSp>
+      <p:cxnSp>
+        <p:nvCxnSpPr>
+          <p:cNvPr id="62" name="Straight Arrow Connector 61"/>
+          <p:cNvCxnSpPr/>
+          <p:nvPr/>
+        </p:nvCxnSpPr>
+        <p:spPr>
+          <a:xfrm>
+            <a:off x="2709583" y="5510798"/>
+            <a:ext cx="3910088" cy="0"/>
+          </a:xfrm>
+          <a:prstGeom prst="straightConnector1">
+            <a:avLst/>
+          </a:prstGeom>
+          <a:ln w="28575" cmpd="sng">
+            <a:solidFill>
+              <a:srgbClr val="FF0000"/>
+            </a:solidFill>
+            <a:tailEnd type="arrow"/>
+          </a:ln>
+        </p:spPr>
+        <p:style>
+          <a:lnRef idx="2">
+            <a:schemeClr val="accent1"/>
+          </a:lnRef>
+          <a:fillRef idx="0">
+            <a:schemeClr val="accent1"/>
+          </a:fillRef>
+          <a:effectRef idx="1">
+            <a:schemeClr val="accent1"/>
+          </a:effectRef>
+          <a:fontRef idx="minor">
+            <a:schemeClr val="tx1"/>
+          </a:fontRef>
+        </p:style>
+      </p:cxnSp>
+      <p:sp>
+        <p:nvSpPr>
+          <p:cNvPr id="63" name="TextBox 62"/>
+          <p:cNvSpPr txBox="1"/>
+          <p:nvPr/>
+        </p:nvSpPr>
+        <p:spPr>
+          <a:xfrm>
+            <a:off x="5362476" y="873546"/>
+            <a:ext cx="1642246" cy="369332"/>
+          </a:xfrm>
+          <a:prstGeom prst="rect">
+            <a:avLst/>
+          </a:prstGeom>
+          <a:noFill/>
+        </p:spPr>
+        <p:txBody>
+          <a:bodyPr wrap="none" rtlCol="0">
+            <a:spAutoFit/>
+          </a:bodyPr>
+          <a:lstStyle/>
+          <a:p>
+            <a:r>
+              <a:rPr lang="en-US" dirty="0" smtClean="0"/>
+              <a:t>Project name</a:t>
+            </a:r>
+            <a:endParaRPr lang="en-US" dirty="0"/>
+          </a:p>
+        </p:txBody>
+      </p:sp>
+      <p:sp>
+        <p:nvSpPr>
+          <p:cNvPr id="64" name="TextBox 63"/>
+          <p:cNvSpPr txBox="1"/>
+          <p:nvPr/>
+        </p:nvSpPr>
+        <p:spPr>
+          <a:xfrm>
+            <a:off x="5926949" y="1757966"/>
+            <a:ext cx="2570874" cy="369332"/>
+          </a:xfrm>
+          <a:prstGeom prst="rect">
+            <a:avLst/>
+          </a:prstGeom>
+          <a:noFill/>
+        </p:spPr>
+        <p:txBody>
+          <a:bodyPr wrap="none" rtlCol="0">
+            <a:spAutoFit/>
+          </a:bodyPr>
+          <a:lstStyle/>
+          <a:p>
+            <a:r>
+              <a:rPr lang="en-US" dirty="0"/>
+              <a:t>B</a:t>
+            </a:r>
+            <a:r>
+              <a:rPr lang="en-US" dirty="0" smtClean="0"/>
+              <a:t>ack end model, Java</a:t>
+            </a:r>
+            <a:endParaRPr lang="en-US" dirty="0"/>
+          </a:p>
+        </p:txBody>
+      </p:sp>
+      <p:sp>
+        <p:nvSpPr>
+          <p:cNvPr id="65" name="TextBox 64"/>
+          <p:cNvSpPr txBox="1"/>
+          <p:nvPr/>
+        </p:nvSpPr>
+        <p:spPr>
+          <a:xfrm>
+            <a:off x="5955869" y="2270990"/>
+            <a:ext cx="2913065" cy="369332"/>
+          </a:xfrm>
+          <a:prstGeom prst="rect">
+            <a:avLst/>
+          </a:prstGeom>
+          <a:noFill/>
+        </p:spPr>
+        <p:txBody>
+          <a:bodyPr wrap="none" rtlCol="0">
+            <a:spAutoFit/>
+          </a:bodyPr>
+          <a:lstStyle/>
+          <a:p>
+            <a:r>
+              <a:rPr lang="en-US" dirty="0"/>
+              <a:t>B</a:t>
+            </a:r>
+            <a:r>
+              <a:rPr lang="en-US" dirty="0" smtClean="0"/>
+              <a:t>ack end controller, Java</a:t>
+            </a:r>
+            <a:endParaRPr lang="en-US" dirty="0"/>
+          </a:p>
+        </p:txBody>
+      </p:sp>
+      <p:sp>
+        <p:nvSpPr>
+          <p:cNvPr id="66" name="TextBox 65"/>
+          <p:cNvSpPr txBox="1"/>
+          <p:nvPr/>
+        </p:nvSpPr>
+        <p:spPr>
+          <a:xfrm>
+            <a:off x="6020069" y="3566491"/>
+            <a:ext cx="1878714" cy="369332"/>
+          </a:xfrm>
+          <a:prstGeom prst="rect">
+            <a:avLst/>
+          </a:prstGeom>
+          <a:noFill/>
+        </p:spPr>
+        <p:txBody>
+          <a:bodyPr wrap="none" rtlCol="0">
+            <a:spAutoFit/>
+          </a:bodyPr>
+          <a:lstStyle/>
+          <a:p>
+            <a:r>
+              <a:rPr lang="en-US" dirty="0" smtClean="0"/>
+              <a:t>Front end views</a:t>
+            </a:r>
+            <a:endParaRPr lang="en-US" dirty="0"/>
+          </a:p>
+        </p:txBody>
+      </p:sp>
+      <p:sp>
+        <p:nvSpPr>
+          <p:cNvPr id="67" name="TextBox 66"/>
+          <p:cNvSpPr txBox="1"/>
+          <p:nvPr/>
+        </p:nvSpPr>
+        <p:spPr>
+          <a:xfrm>
+            <a:off x="6584382" y="4101879"/>
+            <a:ext cx="2397298" cy="369332"/>
+          </a:xfrm>
+          <a:prstGeom prst="rect">
+            <a:avLst/>
+          </a:prstGeom>
+          <a:noFill/>
+        </p:spPr>
+        <p:txBody>
+          <a:bodyPr wrap="none" rtlCol="0">
+            <a:spAutoFit/>
+          </a:bodyPr>
+          <a:lstStyle/>
+          <a:p>
+            <a:r>
+              <a:rPr lang="en-US" dirty="0"/>
+              <a:t>V</a:t>
+            </a:r>
+            <a:r>
+              <a:rPr lang="en-US" dirty="0" smtClean="0"/>
+              <a:t>iews styling, CSS…</a:t>
+            </a:r>
+          </a:p>
+        </p:txBody>
+      </p:sp>
+      <p:sp>
+        <p:nvSpPr>
+          <p:cNvPr id="68" name="TextBox 67"/>
+          <p:cNvSpPr txBox="1"/>
+          <p:nvPr/>
+        </p:nvSpPr>
+        <p:spPr>
+          <a:xfrm>
+            <a:off x="6578022" y="5312748"/>
+            <a:ext cx="2446102" cy="369332"/>
+          </a:xfrm>
+          <a:prstGeom prst="rect">
+            <a:avLst/>
+          </a:prstGeom>
+          <a:noFill/>
+        </p:spPr>
+        <p:txBody>
+          <a:bodyPr wrap="none" rtlCol="0">
+            <a:spAutoFit/>
+          </a:bodyPr>
+          <a:lstStyle/>
+          <a:p>
+            <a:r>
+              <a:rPr lang="en-US" dirty="0"/>
+              <a:t>V</a:t>
+            </a:r>
+            <a:r>
+              <a:rPr lang="en-US" dirty="0" smtClean="0"/>
+              <a:t>iews source, html…</a:t>
+            </a:r>
+          </a:p>
+        </p:txBody>
+      </p:sp>
     </p:spTree>
     <p:extLst>
       <p:ext uri="{BB962C8B-B14F-4D97-AF65-F5344CB8AC3E}">

</xml_diff>